<commit_message>
Updated Center for Spatial Data Science Presentation
</commit_message>
<xml_diff>
--- a/write-ups/presentation/CANOPY Project - 2018-04-17 - Spatial Data Science Study Group.pptx
+++ b/write-ups/presentation/CANOPY Project - 2018-04-17 - Spatial Data Science Study Group.pptx
@@ -4084,6 +4084,37 @@
                       <m:jc m:val="centerGroup"/>
                     </m:oMathParaPr>
                     <m:oMath xmlns:m="http://schemas.openxmlformats.org/officeDocument/2006/math">
+                      <m:sSub>
+                        <m:sSubPr>
+                          <m:ctrlPr>
+                            <a:rPr lang="en-US" i="1">
+                              <a:latin typeface="Cambria Math" panose="02040503050406030204" pitchFamily="18" charset="0"/>
+                            </a:rPr>
+                          </m:ctrlPr>
+                        </m:sSubPr>
+                        <m:e>
+                          <m:r>
+                            <a:rPr lang="en-US" i="1">
+                              <a:latin typeface="Cambria Math" panose="02040503050406030204" pitchFamily="18" charset="0"/>
+                            </a:rPr>
+                            <m:t>𝑃</m:t>
+                          </m:r>
+                        </m:e>
+                        <m:sub>
+                          <m:r>
+                            <a:rPr lang="en-US" i="1">
+                              <a:latin typeface="Cambria Math" panose="02040503050406030204" pitchFamily="18" charset="0"/>
+                            </a:rPr>
+                            <m:t>𝑖𝑗</m:t>
+                          </m:r>
+                        </m:sub>
+                      </m:sSub>
+                      <m:r>
+                        <a:rPr lang="en-US" i="1">
+                          <a:latin typeface="Cambria Math" panose="02040503050406030204" pitchFamily="18" charset="0"/>
+                        </a:rPr>
+                        <m:t>≡</m:t>
+                      </m:r>
                       <m:r>
                         <a:rPr lang="en-US" b="0" i="1" smtClean="0">
                           <a:latin typeface="Cambria Math" panose="02040503050406030204" pitchFamily="18" charset="0"/>
@@ -4216,37 +4247,6 @@
                           </m:sSubSup>
                         </m:e>
                       </m:d>
-                      <m:r>
-                        <a:rPr lang="en-US" b="0" i="1" smtClean="0">
-                          <a:latin typeface="Cambria Math" panose="02040503050406030204" pitchFamily="18" charset="0"/>
-                        </a:rPr>
-                        <m:t>≡</m:t>
-                      </m:r>
-                      <m:sSub>
-                        <m:sSubPr>
-                          <m:ctrlPr>
-                            <a:rPr lang="en-US" i="1">
-                              <a:latin typeface="Cambria Math" panose="02040503050406030204" pitchFamily="18" charset="0"/>
-                            </a:rPr>
-                          </m:ctrlPr>
-                        </m:sSubPr>
-                        <m:e>
-                          <m:r>
-                            <a:rPr lang="en-US" b="0" i="1" smtClean="0">
-                              <a:latin typeface="Cambria Math" panose="02040503050406030204" pitchFamily="18" charset="0"/>
-                            </a:rPr>
-                            <m:t>𝑃</m:t>
-                          </m:r>
-                        </m:e>
-                        <m:sub>
-                          <m:r>
-                            <a:rPr lang="en-US" i="1">
-                              <a:latin typeface="Cambria Math" panose="02040503050406030204" pitchFamily="18" charset="0"/>
-                            </a:rPr>
-                            <m:t>𝑖𝑗</m:t>
-                          </m:r>
-                        </m:sub>
-                      </m:sSub>
                       <m:r>
                         <a:rPr lang="en-US" i="1">
                           <a:latin typeface="Cambria Math" panose="02040503050406030204" pitchFamily="18" charset="0"/>
@@ -4626,7 +4626,7 @@
                 <a:pPr lvl="1"/>
                 <a:r>
                   <a:rPr lang="en-US" dirty="0" smtClean="0"/>
-                  <a:t>For youth programs: athletic, STEM, creative arts focus; calendar of activities</a:t>
+                  <a:t>For youth programs: program focus (e.g. STEM, creative arts, athletics), calendar of activities</a:t>
                 </a:r>
               </a:p>
               <a:p>
@@ -5380,7 +5380,7 @@
         <p:spPr/>
         <p:txBody>
           <a:bodyPr>
-            <a:normAutofit/>
+            <a:normAutofit fontScale="90000"/>
           </a:bodyPr>
           <a:lstStyle/>
           <a:p>
@@ -5389,12 +5389,8 @@
               <a:t>2</a:t>
             </a:r>
             <a:r>
-              <a:rPr lang="en-US" dirty="0" smtClean="0"/>
-              <a:t>. </a:t>
-            </a:r>
-            <a:r>
-              <a:rPr lang="en-US" dirty="0" smtClean="0"/>
-              <a:t>Articulating Objective + Constraint</a:t>
+              <a:rPr lang="en-US" dirty="0"/>
+              <a:t>. Articulation of Objectives + Constraints</a:t>
             </a:r>
             <a:endParaRPr lang="en-US" dirty="0">
               <a:solidFill>
@@ -6329,31 +6325,25 @@
                     <m:sSub>
                       <m:sSubPr>
                         <m:ctrlPr>
-                          <a:rPr lang="en-US" b="0" i="0" smtClean="0">
+                          <a:rPr lang="en-US" i="1">
                             <a:latin typeface="Cambria Math" panose="02040503050406030204" pitchFamily="18" charset="0"/>
                           </a:rPr>
                         </m:ctrlPr>
                       </m:sSubPr>
                       <m:e>
                         <m:r>
-                          <m:rPr>
-                            <m:sty m:val="p"/>
-                          </m:rPr>
-                          <a:rPr lang="en-US" b="0" i="0" smtClean="0">
+                          <a:rPr lang="en-US" i="1">
                             <a:latin typeface="Cambria Math" panose="02040503050406030204" pitchFamily="18" charset="0"/>
                           </a:rPr>
-                          <m:t>n</m:t>
+                          <m:t>𝑛</m:t>
                         </m:r>
                       </m:e>
                       <m:sub>
                         <m:r>
-                          <m:rPr>
-                            <m:sty m:val="p"/>
-                          </m:rPr>
-                          <a:rPr lang="en-US" b="0" i="0" smtClean="0">
+                          <a:rPr lang="en-US" i="1">
                             <a:latin typeface="Cambria Math" panose="02040503050406030204" pitchFamily="18" charset="0"/>
                           </a:rPr>
-                          <m:t>j</m:t>
+                          <m:t>𝑗</m:t>
                         </m:r>
                       </m:sub>
                     </m:sSub>
@@ -6513,7 +6503,7 @@
                 <a:pPr lvl="1"/>
                 <a:r>
                   <a:rPr lang="en-US" dirty="0" smtClean="0"/>
-                  <a:t>This may be endogenously set (hope to address in future work)</a:t>
+                  <a:t>This may be endogenously set (a potential for future work)</a:t>
                 </a:r>
               </a:p>
             </p:txBody>
@@ -6665,12 +6655,12 @@
             <p:spPr>
               <a:xfrm>
                 <a:off x="838200" y="2078037"/>
-                <a:ext cx="10515600" cy="4355420"/>
+                <a:ext cx="10515600" cy="4779964"/>
               </a:xfrm>
             </p:spPr>
             <p:txBody>
               <a:bodyPr vert="horz" lIns="91440" tIns="45720" rIns="91440" bIns="45720" rtlCol="0" anchor="t">
-                <a:normAutofit fontScale="55000" lnSpcReduction="20000"/>
+                <a:normAutofit fontScale="70000" lnSpcReduction="20000"/>
               </a:bodyPr>
               <a:lstStyle/>
               <a:p>
@@ -7360,7 +7350,7 @@
                 </a14:m>
                 <a:r>
                   <a:rPr lang="en-US" dirty="0" smtClean="0"/>
-                  <a:t> is related to lottery chances</a:t>
+                  <a:t> is related to lottery chances:</a:t>
                 </a:r>
               </a:p>
               <a:p>
@@ -7525,9 +7515,6 @@
                 <a:endParaRPr lang="en-US" dirty="0" smtClean="0"/>
               </a:p>
               <a:p>
-                <a:endParaRPr lang="en-US" dirty="0" smtClean="0"/>
-              </a:p>
-              <a:p>
                 <a:pPr marL="0" indent="0">
                   <a:buNone/>
                 </a:pPr>
@@ -7550,12 +7537,12 @@
             <p:spPr>
               <a:xfrm>
                 <a:off x="838200" y="2078037"/>
-                <a:ext cx="10515600" cy="4355420"/>
+                <a:ext cx="10515600" cy="4779964"/>
               </a:xfrm>
               <a:blipFill rotWithShape="0">
                 <a:blip r:embed="rId2"/>
                 <a:stretch>
-                  <a:fillRect l="-522" t="-2241"/>
+                  <a:fillRect l="-754" t="-2551" b="-1148"/>
                 </a:stretch>
               </a:blipFill>
             </p:spPr>
@@ -8024,7 +8011,7 @@
                 </a14:m>
                 <a:r>
                   <a:rPr lang="en-US" dirty="0" smtClean="0"/>
-                  <a:t>                    (depends on “pre”-determined factors)</a:t>
+                  <a:t>                    	(depends on “pre”-determined factors)</a:t>
                 </a:r>
                 <a:endParaRPr lang="en-US" b="0" i="1" dirty="0" smtClean="0">
                   <a:latin typeface="Cambria Math" panose="02040503050406030204" pitchFamily="18" charset="0"/>
@@ -8268,7 +8255,7 @@
                 </a14:m>
                 <a:r>
                   <a:rPr lang="en-US" dirty="0" smtClean="0"/>
-                  <a:t> (depends on endogenous factors)</a:t>
+                  <a:t> 	(depends on endogenous factors)</a:t>
                 </a:r>
               </a:p>
               <a:p>
@@ -9220,7 +9207,7 @@
             </p:spPr>
             <p:txBody>
               <a:bodyPr vert="horz" lIns="91440" tIns="45720" rIns="91440" bIns="45720" rtlCol="0" anchor="t">
-                <a:normAutofit fontScale="62500" lnSpcReduction="20000"/>
+                <a:normAutofit fontScale="92500" lnSpcReduction="10000"/>
               </a:bodyPr>
               <a:lstStyle/>
               <a:p>
@@ -9637,104 +9624,326 @@
                 </a:r>
               </a:p>
               <a:p>
-                <a:pPr marL="0" indent="0">
+                <a:pPr marL="0" indent="0" algn="ctr">
                   <a:buNone/>
                 </a:pPr>
                 <a14:m>
-                  <m:oMathPara xmlns:m="http://schemas.openxmlformats.org/officeDocument/2006/math">
-                    <m:oMathParaPr>
-                      <m:jc m:val="centerGroup"/>
-                    </m:oMathParaPr>
-                    <m:oMath xmlns:m="http://schemas.openxmlformats.org/officeDocument/2006/math">
-                      <m:nary>
-                        <m:naryPr>
-                          <m:chr m:val="∑"/>
-                          <m:limLoc m:val="subSup"/>
-                          <m:ctrlPr>
-                            <a:rPr lang="en-US" b="0" i="1" smtClean="0">
-                              <a:latin typeface="Cambria Math" panose="02040503050406030204" pitchFamily="18" charset="0"/>
-                            </a:rPr>
-                          </m:ctrlPr>
-                        </m:naryPr>
-                        <m:sub>
-                          <m:r>
-                            <m:rPr>
-                              <m:brk m:alnAt="25"/>
-                            </m:rPr>
-                            <a:rPr lang="en-US" b="0" i="1" smtClean="0">
-                              <a:latin typeface="Cambria Math" panose="02040503050406030204" pitchFamily="18" charset="0"/>
-                            </a:rPr>
-                            <m:t>𝑗</m:t>
-                          </m:r>
-                          <m:r>
-                            <a:rPr lang="en-US" b="0" i="1" smtClean="0">
-                              <a:latin typeface="Cambria Math" panose="02040503050406030204" pitchFamily="18" charset="0"/>
-                            </a:rPr>
-                            <m:t>=1</m:t>
-                          </m:r>
-                        </m:sub>
-                        <m:sup>
-                          <m:r>
-                            <a:rPr lang="en-US" b="0" i="1" smtClean="0">
-                              <a:latin typeface="Cambria Math" panose="02040503050406030204" pitchFamily="18" charset="0"/>
-                            </a:rPr>
-                            <m:t>𝐽</m:t>
-                          </m:r>
-                          <m:r>
-                            <a:rPr lang="en-US" b="0" i="1" smtClean="0">
-                              <a:latin typeface="Cambria Math" panose="02040503050406030204" pitchFamily="18" charset="0"/>
-                            </a:rPr>
-                            <m:t>+</m:t>
-                          </m:r>
-                          <m:r>
-                            <a:rPr lang="en-US" b="0" i="1" smtClean="0">
-                              <a:latin typeface="Cambria Math" panose="02040503050406030204" pitchFamily="18" charset="0"/>
-                            </a:rPr>
-                            <m:t>𝑞</m:t>
-                          </m:r>
-                        </m:sup>
-                        <m:e>
-                          <m:sSub>
-                            <m:sSubPr>
-                              <m:ctrlPr>
-                                <a:rPr lang="en-US" b="0" i="1" smtClean="0">
-                                  <a:latin typeface="Cambria Math" panose="02040503050406030204" pitchFamily="18" charset="0"/>
-                                </a:rPr>
-                              </m:ctrlPr>
-                            </m:sSubPr>
-                            <m:e>
-                              <m:r>
-                                <a:rPr lang="en-US" b="0" i="1" smtClean="0">
-                                  <a:latin typeface="Cambria Math" panose="02040503050406030204" pitchFamily="18" charset="0"/>
-                                </a:rPr>
-                                <m:t>𝑟</m:t>
-                              </m:r>
-                            </m:e>
-                            <m:sub>
-                              <m:r>
-                                <a:rPr lang="en-US" b="0" i="1" smtClean="0">
-                                  <a:latin typeface="Cambria Math" panose="02040503050406030204" pitchFamily="18" charset="0"/>
-                                </a:rPr>
-                                <m:t>𝑗</m:t>
-                              </m:r>
-                            </m:sub>
-                          </m:sSub>
-                        </m:e>
-                      </m:nary>
-                      <m:r>
-                        <a:rPr lang="en-US" b="0" i="1" smtClean="0">
-                          <a:latin typeface="Cambria Math" panose="02040503050406030204" pitchFamily="18" charset="0"/>
-                        </a:rPr>
-                        <m:t>≤</m:t>
-                      </m:r>
-                      <m:r>
-                        <a:rPr lang="en-US" b="0" i="1" smtClean="0">
-                          <a:latin typeface="Cambria Math" panose="02040503050406030204" pitchFamily="18" charset="0"/>
-                        </a:rPr>
-                        <m:t>𝑅</m:t>
-                      </m:r>
-                    </m:oMath>
-                  </m:oMathPara>
+                  <m:oMath xmlns:m="http://schemas.openxmlformats.org/officeDocument/2006/math">
+                    <m:nary>
+                      <m:naryPr>
+                        <m:chr m:val="∑"/>
+                        <m:limLoc m:val="subSup"/>
+                        <m:ctrlPr>
+                          <a:rPr lang="en-US" b="0" i="1" smtClean="0">
+                            <a:latin typeface="Cambria Math" panose="02040503050406030204" pitchFamily="18" charset="0"/>
+                          </a:rPr>
+                        </m:ctrlPr>
+                      </m:naryPr>
+                      <m:sub>
+                        <m:r>
+                          <m:rPr>
+                            <m:brk m:alnAt="25"/>
+                          </m:rPr>
+                          <a:rPr lang="en-US" b="0" i="1" smtClean="0">
+                            <a:latin typeface="Cambria Math" panose="02040503050406030204" pitchFamily="18" charset="0"/>
+                          </a:rPr>
+                          <m:t>𝑗</m:t>
+                        </m:r>
+                        <m:r>
+                          <a:rPr lang="en-US" b="0" i="1" smtClean="0">
+                            <a:latin typeface="Cambria Math" panose="02040503050406030204" pitchFamily="18" charset="0"/>
+                          </a:rPr>
+                          <m:t>=1</m:t>
+                        </m:r>
+                      </m:sub>
+                      <m:sup>
+                        <m:r>
+                          <a:rPr lang="en-US" b="0" i="1" smtClean="0">
+                            <a:latin typeface="Cambria Math" panose="02040503050406030204" pitchFamily="18" charset="0"/>
+                          </a:rPr>
+                          <m:t>𝐽</m:t>
+                        </m:r>
+                        <m:r>
+                          <a:rPr lang="en-US" b="0" i="1" smtClean="0">
+                            <a:latin typeface="Cambria Math" panose="02040503050406030204" pitchFamily="18" charset="0"/>
+                          </a:rPr>
+                          <m:t>+</m:t>
+                        </m:r>
+                        <m:r>
+                          <a:rPr lang="en-US" b="0" i="1" smtClean="0">
+                            <a:latin typeface="Cambria Math" panose="02040503050406030204" pitchFamily="18" charset="0"/>
+                          </a:rPr>
+                          <m:t>𝑞</m:t>
+                        </m:r>
+                      </m:sup>
+                      <m:e>
+                        <m:sSub>
+                          <m:sSubPr>
+                            <m:ctrlPr>
+                              <a:rPr lang="en-US" b="0" i="1" smtClean="0">
+                                <a:latin typeface="Cambria Math" panose="02040503050406030204" pitchFamily="18" charset="0"/>
+                              </a:rPr>
+                            </m:ctrlPr>
+                          </m:sSubPr>
+                          <m:e>
+                            <m:r>
+                              <a:rPr lang="en-US" b="0" i="1" smtClean="0">
+                                <a:latin typeface="Cambria Math" panose="02040503050406030204" pitchFamily="18" charset="0"/>
+                              </a:rPr>
+                              <m:t>𝑟</m:t>
+                            </m:r>
+                          </m:e>
+                          <m:sub>
+                            <m:r>
+                              <a:rPr lang="en-US" b="0" i="1" smtClean="0">
+                                <a:latin typeface="Cambria Math" panose="02040503050406030204" pitchFamily="18" charset="0"/>
+                              </a:rPr>
+                              <m:t>𝑗</m:t>
+                            </m:r>
+                          </m:sub>
+                        </m:sSub>
+                      </m:e>
+                    </m:nary>
+                    <m:r>
+                      <a:rPr lang="en-US" b="0" i="1" smtClean="0">
+                        <a:latin typeface="Cambria Math" panose="02040503050406030204" pitchFamily="18" charset="0"/>
+                      </a:rPr>
+                      <m:t>≤</m:t>
+                    </m:r>
+                    <m:r>
+                      <a:rPr lang="en-US" b="0" i="1" smtClean="0">
+                        <a:latin typeface="Cambria Math" panose="02040503050406030204" pitchFamily="18" charset="0"/>
+                      </a:rPr>
+                      <m:t>𝑅</m:t>
+                    </m:r>
+                  </m:oMath>
+                </a14:m>
+                <a:r>
+                  <a:rPr lang="en-US" b="0" dirty="0" smtClean="0"/>
+                  <a:t>,      </a:t>
+                </a:r>
+                <a14:m>
+                  <m:oMath xmlns:m="http://schemas.openxmlformats.org/officeDocument/2006/math">
+                    <m:nary>
+                      <m:naryPr>
+                        <m:chr m:val="∑"/>
+                        <m:limLoc m:val="subSup"/>
+                        <m:ctrlPr>
+                          <a:rPr lang="en-US" i="1">
+                            <a:latin typeface="Cambria Math" panose="02040503050406030204" pitchFamily="18" charset="0"/>
+                          </a:rPr>
+                        </m:ctrlPr>
+                      </m:naryPr>
+                      <m:sub>
+                        <m:r>
+                          <m:rPr>
+                            <m:brk m:alnAt="25"/>
+                          </m:rPr>
+                          <a:rPr lang="en-US" i="1">
+                            <a:latin typeface="Cambria Math" panose="02040503050406030204" pitchFamily="18" charset="0"/>
+                          </a:rPr>
+                          <m:t>𝑗</m:t>
+                        </m:r>
+                        <m:r>
+                          <a:rPr lang="en-US" i="1">
+                            <a:latin typeface="Cambria Math" panose="02040503050406030204" pitchFamily="18" charset="0"/>
+                          </a:rPr>
+                          <m:t>=1</m:t>
+                        </m:r>
+                      </m:sub>
+                      <m:sup>
+                        <m:r>
+                          <a:rPr lang="en-US" i="1">
+                            <a:latin typeface="Cambria Math" panose="02040503050406030204" pitchFamily="18" charset="0"/>
+                          </a:rPr>
+                          <m:t>𝐽</m:t>
+                        </m:r>
+                        <m:r>
+                          <a:rPr lang="en-US" i="1">
+                            <a:latin typeface="Cambria Math" panose="02040503050406030204" pitchFamily="18" charset="0"/>
+                          </a:rPr>
+                          <m:t>+</m:t>
+                        </m:r>
+                        <m:r>
+                          <a:rPr lang="en-US" b="0" i="1" smtClean="0">
+                            <a:latin typeface="Cambria Math" panose="02040503050406030204" pitchFamily="18" charset="0"/>
+                          </a:rPr>
+                          <m:t>𝑞</m:t>
+                        </m:r>
+                      </m:sup>
+                      <m:e>
+                        <m:sSub>
+                          <m:sSubPr>
+                            <m:ctrlPr>
+                              <a:rPr lang="en-US" i="1">
+                                <a:latin typeface="Cambria Math" panose="02040503050406030204" pitchFamily="18" charset="0"/>
+                              </a:rPr>
+                            </m:ctrlPr>
+                          </m:sSubPr>
+                          <m:e>
+                            <m:r>
+                              <a:rPr lang="en-US" b="0" i="1" smtClean="0">
+                                <a:latin typeface="Cambria Math" panose="02040503050406030204" pitchFamily="18" charset="0"/>
+                              </a:rPr>
+                              <m:t>𝑠</m:t>
+                            </m:r>
+                          </m:e>
+                          <m:sub>
+                            <m:r>
+                              <a:rPr lang="en-US" i="1">
+                                <a:latin typeface="Cambria Math" panose="02040503050406030204" pitchFamily="18" charset="0"/>
+                              </a:rPr>
+                              <m:t>𝑗</m:t>
+                            </m:r>
+                          </m:sub>
+                        </m:sSub>
+                      </m:e>
+                    </m:nary>
+                    <m:r>
+                      <a:rPr lang="en-US" b="0" i="1" smtClean="0">
+                        <a:latin typeface="Cambria Math" panose="02040503050406030204" pitchFamily="18" charset="0"/>
+                      </a:rPr>
+                      <m:t>≤</m:t>
+                    </m:r>
+                    <m:r>
+                      <a:rPr lang="en-US" b="0" i="1" smtClean="0">
+                        <a:latin typeface="Cambria Math" panose="02040503050406030204" pitchFamily="18" charset="0"/>
+                      </a:rPr>
+                      <m:t>𝑆</m:t>
+                    </m:r>
+                  </m:oMath>
+                </a14:m>
+                <a:r>
+                  <a:rPr lang="en-US" b="0" dirty="0" smtClean="0"/>
+                  <a:t>,</a:t>
+                </a:r>
+                <a:r>
+                  <a:rPr lang="en-US" dirty="0"/>
+                  <a:t> </a:t>
+                </a:r>
+                <a:r>
+                  <a:rPr lang="en-US" dirty="0" smtClean="0"/>
+                  <a:t>   </a:t>
+                </a:r>
+                <a14:m>
+                  <m:oMath xmlns:m="http://schemas.openxmlformats.org/officeDocument/2006/math">
+                    <m:nary>
+                      <m:naryPr>
+                        <m:chr m:val="∑"/>
+                        <m:limLoc m:val="subSup"/>
+                        <m:ctrlPr>
+                          <a:rPr lang="en-US" i="1">
+                            <a:latin typeface="Cambria Math" panose="02040503050406030204" pitchFamily="18" charset="0"/>
+                          </a:rPr>
+                        </m:ctrlPr>
+                      </m:naryPr>
+                      <m:sub>
+                        <m:r>
+                          <m:rPr>
+                            <m:brk m:alnAt="1"/>
+                          </m:rPr>
+                          <a:rPr lang="en-US" b="0" i="1" smtClean="0">
+                            <a:latin typeface="Cambria Math" panose="02040503050406030204" pitchFamily="18" charset="0"/>
+                          </a:rPr>
+                          <m:t>𝑘</m:t>
+                        </m:r>
+                        <m:r>
+                          <a:rPr lang="en-US" i="1">
+                            <a:latin typeface="Cambria Math" panose="02040503050406030204" pitchFamily="18" charset="0"/>
+                          </a:rPr>
+                          <m:t>=</m:t>
+                        </m:r>
+                        <m:r>
+                          <a:rPr lang="en-US" b="0" i="1" smtClean="0">
+                            <a:latin typeface="Cambria Math" panose="02040503050406030204" pitchFamily="18" charset="0"/>
+                          </a:rPr>
+                          <m:t>𝐽</m:t>
+                        </m:r>
+                        <m:r>
+                          <a:rPr lang="en-US" b="0" i="1" smtClean="0">
+                            <a:latin typeface="Cambria Math" panose="02040503050406030204" pitchFamily="18" charset="0"/>
+                          </a:rPr>
+                          <m:t>+1</m:t>
+                        </m:r>
+                      </m:sub>
+                      <m:sup>
+                        <m:r>
+                          <a:rPr lang="en-US" i="1">
+                            <a:latin typeface="Cambria Math" panose="02040503050406030204" pitchFamily="18" charset="0"/>
+                          </a:rPr>
+                          <m:t>𝐽</m:t>
+                        </m:r>
+                        <m:r>
+                          <a:rPr lang="en-US" i="1">
+                            <a:latin typeface="Cambria Math" panose="02040503050406030204" pitchFamily="18" charset="0"/>
+                          </a:rPr>
+                          <m:t>+</m:t>
+                        </m:r>
+                        <m:r>
+                          <a:rPr lang="en-US" b="0" i="1" smtClean="0">
+                            <a:latin typeface="Cambria Math" panose="02040503050406030204" pitchFamily="18" charset="0"/>
+                          </a:rPr>
+                          <m:t>𝑞</m:t>
+                        </m:r>
+                      </m:sup>
+                      <m:e>
+                        <m:r>
+                          <a:rPr lang="en-US" b="0" i="1" smtClean="0">
+                            <a:latin typeface="Cambria Math" panose="02040503050406030204" pitchFamily="18" charset="0"/>
+                          </a:rPr>
+                          <m:t>𝑐</m:t>
+                        </m:r>
+                        <m:d>
+                          <m:dPr>
+                            <m:ctrlPr>
+                              <a:rPr lang="en-US" b="0" i="1" smtClean="0">
+                                <a:latin typeface="Cambria Math" panose="02040503050406030204" pitchFamily="18" charset="0"/>
+                              </a:rPr>
+                            </m:ctrlPr>
+                          </m:dPr>
+                          <m:e>
+                            <m:sSub>
+                              <m:sSubPr>
+                                <m:ctrlPr>
+                                  <a:rPr lang="en-US" b="0" i="1" smtClean="0">
+                                    <a:latin typeface="Cambria Math" panose="02040503050406030204" pitchFamily="18" charset="0"/>
+                                  </a:rPr>
+                                </m:ctrlPr>
+                              </m:sSubPr>
+                              <m:e>
+                                <m:r>
+                                  <a:rPr lang="en-US" b="0" i="1" smtClean="0">
+                                    <a:latin typeface="Cambria Math" panose="02040503050406030204" pitchFamily="18" charset="0"/>
+                                  </a:rPr>
+                                  <m:t>𝑤</m:t>
+                                </m:r>
+                              </m:e>
+                              <m:sub>
+                                <m:r>
+                                  <a:rPr lang="en-US" b="0" i="1" smtClean="0">
+                                    <a:latin typeface="Cambria Math" panose="02040503050406030204" pitchFamily="18" charset="0"/>
+                                  </a:rPr>
+                                  <m:t>𝑘</m:t>
+                                </m:r>
+                              </m:sub>
+                            </m:sSub>
+                          </m:e>
+                        </m:d>
+                      </m:e>
+                    </m:nary>
+                    <m:r>
+                      <a:rPr lang="en-US" b="0" i="1" smtClean="0">
+                        <a:latin typeface="Cambria Math" panose="02040503050406030204" pitchFamily="18" charset="0"/>
+                      </a:rPr>
+                      <m:t>≤</m:t>
+                    </m:r>
+                    <m:r>
+                      <a:rPr lang="en-US" b="0" i="1" smtClean="0">
+                        <a:latin typeface="Cambria Math" panose="02040503050406030204" pitchFamily="18" charset="0"/>
+                      </a:rPr>
+                      <m:t>𝐶</m:t>
+                    </m:r>
+                  </m:oMath>
                 </a14:m>
                 <a:endParaRPr lang="en-US" b="0" dirty="0" smtClean="0"/>
               </a:p>
@@ -9742,248 +9951,7 @@
                 <a:pPr marL="0" indent="0">
                   <a:buNone/>
                 </a:pPr>
-                <a:r>
-                  <a:rPr lang="en-US" b="0" dirty="0" smtClean="0"/>
-                  <a:t/>
-                </a:r>
-                <a:br>
-                  <a:rPr lang="en-US" b="0" dirty="0" smtClean="0"/>
-                </a:br>
-                <a14:m>
-                  <m:oMathPara xmlns:m="http://schemas.openxmlformats.org/officeDocument/2006/math">
-                    <m:oMathParaPr>
-                      <m:jc m:val="centerGroup"/>
-                    </m:oMathParaPr>
-                    <m:oMath xmlns:m="http://schemas.openxmlformats.org/officeDocument/2006/math">
-                      <m:nary>
-                        <m:naryPr>
-                          <m:chr m:val="∑"/>
-                          <m:limLoc m:val="subSup"/>
-                          <m:ctrlPr>
-                            <a:rPr lang="en-US" i="1">
-                              <a:latin typeface="Cambria Math" panose="02040503050406030204" pitchFamily="18" charset="0"/>
-                            </a:rPr>
-                          </m:ctrlPr>
-                        </m:naryPr>
-                        <m:sub>
-                          <m:r>
-                            <m:rPr>
-                              <m:brk m:alnAt="25"/>
-                            </m:rPr>
-                            <a:rPr lang="en-US" i="1">
-                              <a:latin typeface="Cambria Math" panose="02040503050406030204" pitchFamily="18" charset="0"/>
-                            </a:rPr>
-                            <m:t>𝑗</m:t>
-                          </m:r>
-                          <m:r>
-                            <a:rPr lang="en-US" i="1">
-                              <a:latin typeface="Cambria Math" panose="02040503050406030204" pitchFamily="18" charset="0"/>
-                            </a:rPr>
-                            <m:t>=1</m:t>
-                          </m:r>
-                        </m:sub>
-                        <m:sup>
-                          <m:r>
-                            <a:rPr lang="en-US" i="1">
-                              <a:latin typeface="Cambria Math" panose="02040503050406030204" pitchFamily="18" charset="0"/>
-                            </a:rPr>
-                            <m:t>𝐽</m:t>
-                          </m:r>
-                          <m:r>
-                            <a:rPr lang="en-US" i="1">
-                              <a:latin typeface="Cambria Math" panose="02040503050406030204" pitchFamily="18" charset="0"/>
-                            </a:rPr>
-                            <m:t>+</m:t>
-                          </m:r>
-                          <m:r>
-                            <a:rPr lang="en-US" b="0" i="1" smtClean="0">
-                              <a:latin typeface="Cambria Math" panose="02040503050406030204" pitchFamily="18" charset="0"/>
-                            </a:rPr>
-                            <m:t>𝑞</m:t>
-                          </m:r>
-                        </m:sup>
-                        <m:e>
-                          <m:sSub>
-                            <m:sSubPr>
-                              <m:ctrlPr>
-                                <a:rPr lang="en-US" i="1">
-                                  <a:latin typeface="Cambria Math" panose="02040503050406030204" pitchFamily="18" charset="0"/>
-                                </a:rPr>
-                              </m:ctrlPr>
-                            </m:sSubPr>
-                            <m:e>
-                              <m:r>
-                                <a:rPr lang="en-US" b="0" i="1" smtClean="0">
-                                  <a:latin typeface="Cambria Math" panose="02040503050406030204" pitchFamily="18" charset="0"/>
-                                </a:rPr>
-                                <m:t>𝑠</m:t>
-                              </m:r>
-                            </m:e>
-                            <m:sub>
-                              <m:r>
-                                <a:rPr lang="en-US" i="1">
-                                  <a:latin typeface="Cambria Math" panose="02040503050406030204" pitchFamily="18" charset="0"/>
-                                </a:rPr>
-                                <m:t>𝑗</m:t>
-                              </m:r>
-                            </m:sub>
-                          </m:sSub>
-                        </m:e>
-                      </m:nary>
-                      <m:r>
-                        <a:rPr lang="en-US" b="0" i="1" smtClean="0">
-                          <a:latin typeface="Cambria Math" panose="02040503050406030204" pitchFamily="18" charset="0"/>
-                        </a:rPr>
-                        <m:t>≤</m:t>
-                      </m:r>
-                      <m:r>
-                        <a:rPr lang="en-US" b="0" i="1" smtClean="0">
-                          <a:latin typeface="Cambria Math" panose="02040503050406030204" pitchFamily="18" charset="0"/>
-                        </a:rPr>
-                        <m:t>𝑆</m:t>
-                      </m:r>
-                    </m:oMath>
-                  </m:oMathPara>
-                </a14:m>
-                <a:endParaRPr lang="en-US" b="0" dirty="0" smtClean="0"/>
-              </a:p>
-              <a:p>
-                <a:pPr marL="0" indent="0">
-                  <a:buNone/>
-                </a:pPr>
-                <a:r>
-                  <a:rPr lang="en-US" dirty="0"/>
-                  <a:t/>
-                </a:r>
-                <a:br>
-                  <a:rPr lang="en-US" dirty="0"/>
-                </a:br>
-                <a14:m>
-                  <m:oMathPara xmlns:m="http://schemas.openxmlformats.org/officeDocument/2006/math">
-                    <m:oMathParaPr>
-                      <m:jc m:val="centerGroup"/>
-                    </m:oMathParaPr>
-                    <m:oMath xmlns:m="http://schemas.openxmlformats.org/officeDocument/2006/math">
-                      <m:nary>
-                        <m:naryPr>
-                          <m:chr m:val="∑"/>
-                          <m:limLoc m:val="subSup"/>
-                          <m:ctrlPr>
-                            <a:rPr lang="en-US" i="1">
-                              <a:latin typeface="Cambria Math" panose="02040503050406030204" pitchFamily="18" charset="0"/>
-                            </a:rPr>
-                          </m:ctrlPr>
-                        </m:naryPr>
-                        <m:sub>
-                          <m:r>
-                            <m:rPr>
-                              <m:brk m:alnAt="1"/>
-                            </m:rPr>
-                            <a:rPr lang="en-US" b="0" i="1" smtClean="0">
-                              <a:latin typeface="Cambria Math" panose="02040503050406030204" pitchFamily="18" charset="0"/>
-                            </a:rPr>
-                            <m:t>𝑘</m:t>
-                          </m:r>
-                          <m:r>
-                            <a:rPr lang="en-US" i="1">
-                              <a:latin typeface="Cambria Math" panose="02040503050406030204" pitchFamily="18" charset="0"/>
-                            </a:rPr>
-                            <m:t>=</m:t>
-                          </m:r>
-                          <m:r>
-                            <a:rPr lang="en-US" b="0" i="1" smtClean="0">
-                              <a:latin typeface="Cambria Math" panose="02040503050406030204" pitchFamily="18" charset="0"/>
-                            </a:rPr>
-                            <m:t>𝐽</m:t>
-                          </m:r>
-                          <m:r>
-                            <a:rPr lang="en-US" b="0" i="1" smtClean="0">
-                              <a:latin typeface="Cambria Math" panose="02040503050406030204" pitchFamily="18" charset="0"/>
-                            </a:rPr>
-                            <m:t>+1</m:t>
-                          </m:r>
-                        </m:sub>
-                        <m:sup>
-                          <m:r>
-                            <a:rPr lang="en-US" i="1">
-                              <a:latin typeface="Cambria Math" panose="02040503050406030204" pitchFamily="18" charset="0"/>
-                            </a:rPr>
-                            <m:t>𝐽</m:t>
-                          </m:r>
-                          <m:r>
-                            <a:rPr lang="en-US" i="1">
-                              <a:latin typeface="Cambria Math" panose="02040503050406030204" pitchFamily="18" charset="0"/>
-                            </a:rPr>
-                            <m:t>+</m:t>
-                          </m:r>
-                          <m:r>
-                            <a:rPr lang="en-US" b="0" i="1" smtClean="0">
-                              <a:latin typeface="Cambria Math" panose="02040503050406030204" pitchFamily="18" charset="0"/>
-                            </a:rPr>
-                            <m:t>𝑞</m:t>
-                          </m:r>
-                        </m:sup>
-                        <m:e>
-                          <m:r>
-                            <a:rPr lang="en-US" b="0" i="1" smtClean="0">
-                              <a:latin typeface="Cambria Math" panose="02040503050406030204" pitchFamily="18" charset="0"/>
-                            </a:rPr>
-                            <m:t>𝑐</m:t>
-                          </m:r>
-                          <m:d>
-                            <m:dPr>
-                              <m:ctrlPr>
-                                <a:rPr lang="en-US" b="0" i="1" smtClean="0">
-                                  <a:latin typeface="Cambria Math" panose="02040503050406030204" pitchFamily="18" charset="0"/>
-                                </a:rPr>
-                              </m:ctrlPr>
-                            </m:dPr>
-                            <m:e>
-                              <m:sSub>
-                                <m:sSubPr>
-                                  <m:ctrlPr>
-                                    <a:rPr lang="en-US" b="0" i="1" smtClean="0">
-                                      <a:latin typeface="Cambria Math" panose="02040503050406030204" pitchFamily="18" charset="0"/>
-                                    </a:rPr>
-                                  </m:ctrlPr>
-                                </m:sSubPr>
-                                <m:e>
-                                  <m:r>
-                                    <a:rPr lang="en-US" b="0" i="1" smtClean="0">
-                                      <a:latin typeface="Cambria Math" panose="02040503050406030204" pitchFamily="18" charset="0"/>
-                                    </a:rPr>
-                                    <m:t>𝑤</m:t>
-                                  </m:r>
-                                </m:e>
-                                <m:sub>
-                                  <m:r>
-                                    <a:rPr lang="en-US" b="0" i="1" smtClean="0">
-                                      <a:latin typeface="Cambria Math" panose="02040503050406030204" pitchFamily="18" charset="0"/>
-                                    </a:rPr>
-                                    <m:t>𝑘</m:t>
-                                  </m:r>
-                                </m:sub>
-                              </m:sSub>
-                            </m:e>
-                          </m:d>
-                        </m:e>
-                      </m:nary>
-                      <m:r>
-                        <a:rPr lang="en-US" b="0" i="1" smtClean="0">
-                          <a:latin typeface="Cambria Math" panose="02040503050406030204" pitchFamily="18" charset="0"/>
-                        </a:rPr>
-                        <m:t>≤</m:t>
-                      </m:r>
-                      <m:r>
-                        <a:rPr lang="en-US" b="0" i="1" smtClean="0">
-                          <a:latin typeface="Cambria Math" panose="02040503050406030204" pitchFamily="18" charset="0"/>
-                        </a:rPr>
-                        <m:t>𝐶</m:t>
-                      </m:r>
-                    </m:oMath>
-                  </m:oMathPara>
-                </a14:m>
-                <a:endParaRPr lang="en-US" b="0" dirty="0" smtClean="0"/>
+                <a:endParaRPr lang="en-US" dirty="0" smtClean="0"/>
               </a:p>
               <a:p>
                 <a:pPr marL="0" indent="0">
@@ -10096,7 +10064,7 @@
               <a:blipFill rotWithShape="0">
                 <a:blip r:embed="rId2"/>
                 <a:stretch>
-                  <a:fillRect l="-522" t="-2222" b="-16806"/>
+                  <a:fillRect l="-1043" t="-2778"/>
                 </a:stretch>
               </a:blipFill>
             </p:spPr>
@@ -10273,7 +10241,7 @@
                 <a:pPr lvl="1"/>
                 <a:r>
                   <a:rPr lang="en-US" dirty="0" smtClean="0"/>
-                  <a:t>i.e. shadow price of increasing </a:t>
+                  <a:t>i.e. “shadow prices” of </a:t>
                 </a:r>
                 <a14:m>
                   <m:oMath xmlns:m="http://schemas.openxmlformats.org/officeDocument/2006/math">
@@ -10682,6 +10650,17 @@
           <a:lstStyle/>
           <a:p>
             <a:r>
+              <a:rPr lang="en-US" dirty="0"/>
+              <a:t>Additional project </a:t>
+            </a:r>
+            <a:r>
+              <a:rPr lang="en-US" dirty="0" smtClean="0"/>
+              <a:t>definition, and confirmation of partnership</a:t>
+            </a:r>
+            <a:endParaRPr lang="en-US" dirty="0"/>
+          </a:p>
+          <a:p>
+            <a:r>
               <a:rPr lang="en-US" dirty="0" smtClean="0"/>
               <a:t>Permissions</a:t>
             </a:r>
@@ -11532,10 +11511,15 @@
             <p:ph idx="1"/>
           </p:nvPr>
         </p:nvSpPr>
-        <p:spPr/>
+        <p:spPr>
+          <a:xfrm>
+            <a:off x="838200" y="2078037"/>
+            <a:ext cx="10515600" cy="4225227"/>
+          </a:xfrm>
+        </p:spPr>
         <p:txBody>
           <a:bodyPr vert="horz" lIns="91440" tIns="45720" rIns="91440" bIns="45720" rtlCol="0" anchor="t">
-            <a:normAutofit fontScale="77500" lnSpcReduction="20000"/>
+            <a:normAutofit fontScale="85000" lnSpcReduction="20000"/>
           </a:bodyPr>
           <a:lstStyle/>
           <a:p>
@@ -13655,17 +13639,17 @@
 <file path=customXml/itemProps3.xml><?xml version="1.0" encoding="utf-8"?>
 <ds:datastoreItem xmlns:ds="http://schemas.openxmlformats.org/officeDocument/2006/customXml" ds:itemID="{EF0E8110-C174-4EC7-91D5-43DF1FB1294C}">
   <ds:schemaRefs>
+    <ds:schemaRef ds:uri="9b1bb635-3374-4ca0-913d-c1ab6db7bca2"/>
+    <ds:schemaRef ds:uri="http://schemas.openxmlformats.org/package/2006/metadata/core-properties"/>
+    <ds:schemaRef ds:uri="http://purl.org/dc/terms/"/>
+    <ds:schemaRef ds:uri="8543ef5f-ccc3-4d6a-b077-ef2e6806c759"/>
+    <ds:schemaRef ds:uri="http://purl.org/dc/elements/1.1/"/>
+    <ds:schemaRef ds:uri="http://purl.org/dc/dcmitype/"/>
+    <ds:schemaRef ds:uri="http://schemas.microsoft.com/office/infopath/2007/PartnerControls"/>
+    <ds:schemaRef ds:uri="http://schemas.microsoft.com/office/2006/documentManagement/types"/>
+    <ds:schemaRef ds:uri="88bff4ba-cc9f-4650-bddf-7cebf701c83f"/>
+    <ds:schemaRef ds:uri="http://schemas.microsoft.com/office/2006/metadata/properties"/>
     <ds:schemaRef ds:uri="http://www.w3.org/XML/1998/namespace"/>
-    <ds:schemaRef ds:uri="9b1bb635-3374-4ca0-913d-c1ab6db7bca2"/>
-    <ds:schemaRef ds:uri="http://purl.org/dc/elements/1.1/"/>
-    <ds:schemaRef ds:uri="http://purl.org/dc/terms/"/>
-    <ds:schemaRef ds:uri="http://purl.org/dc/dcmitype/"/>
-    <ds:schemaRef ds:uri="http://schemas.microsoft.com/office/2006/documentManagement/types"/>
-    <ds:schemaRef ds:uri="http://schemas.microsoft.com/office/infopath/2007/PartnerControls"/>
-    <ds:schemaRef ds:uri="http://schemas.microsoft.com/office/2006/metadata/properties"/>
-    <ds:schemaRef ds:uri="http://schemas.openxmlformats.org/package/2006/metadata/core-properties"/>
-    <ds:schemaRef ds:uri="88bff4ba-cc9f-4650-bddf-7cebf701c83f"/>
-    <ds:schemaRef ds:uri="8543ef5f-ccc3-4d6a-b077-ef2e6806c759"/>
   </ds:schemaRefs>
 </ds:datastoreItem>
 </file>
</xml_diff>